<commit_message>
update arrows and manual
</commit_message>
<xml_diff>
--- a/doc/JSindo/install_linux.pptx
+++ b/doc/JSindo/install_linux.pptx
@@ -217,7 +217,7 @@
           <a:p>
             <a:fld id="{BB0F0136-69B4-D44B-9FED-4928016A3512}" type="datetimeFigureOut">
               <a:rPr kumimoji="1" lang="ja-JP" altLang="en-US" smtClean="0"/>
-              <a:t>2018/6/13</a:t>
+              <a:t>2018/9/20</a:t>
             </a:fld>
             <a:endParaRPr kumimoji="1" lang="ja-JP" altLang="en-US"/>
           </a:p>
@@ -816,7 +816,7 @@
           <a:p>
             <a:fld id="{8F1A2EAE-8A19-6140-AB90-FBA793328AFC}" type="datetime1">
               <a:rPr kumimoji="1" lang="ja-JP" altLang="en-US" smtClean="0"/>
-              <a:t>2018/6/13</a:t>
+              <a:t>2018/9/20</a:t>
             </a:fld>
             <a:endParaRPr kumimoji="1" lang="ja-JP" altLang="en-US"/>
           </a:p>
@@ -1013,7 +1013,7 @@
           <a:p>
             <a:fld id="{5032F6CD-D8C5-EA47-935C-33C61990A9AF}" type="datetime1">
               <a:rPr kumimoji="1" lang="ja-JP" altLang="en-US" smtClean="0"/>
-              <a:t>2018/6/13</a:t>
+              <a:t>2018/9/20</a:t>
             </a:fld>
             <a:endParaRPr kumimoji="1" lang="ja-JP" altLang="en-US"/>
           </a:p>
@@ -1220,7 +1220,7 @@
           <a:p>
             <a:fld id="{7432CAB7-B1D1-C842-BB27-1789136EF085}" type="datetime1">
               <a:rPr kumimoji="1" lang="ja-JP" altLang="en-US" smtClean="0"/>
-              <a:t>2018/6/13</a:t>
+              <a:t>2018/9/20</a:t>
             </a:fld>
             <a:endParaRPr kumimoji="1" lang="ja-JP" altLang="en-US"/>
           </a:p>
@@ -1417,7 +1417,7 @@
           <a:p>
             <a:fld id="{59F606A1-BF80-4F40-AD73-3A1303D72015}" type="datetime1">
               <a:rPr kumimoji="1" lang="ja-JP" altLang="en-US" smtClean="0"/>
-              <a:t>2018/6/13</a:t>
+              <a:t>2018/9/20</a:t>
             </a:fld>
             <a:endParaRPr kumimoji="1" lang="ja-JP" altLang="en-US"/>
           </a:p>
@@ -1656,7 +1656,7 @@
           <a:p>
             <a:fld id="{201370A8-86D7-DE4D-BAB6-D17D5C3BEC5A}" type="datetime1">
               <a:rPr kumimoji="1" lang="ja-JP" altLang="en-US" smtClean="0"/>
-              <a:t>2018/6/13</a:t>
+              <a:t>2018/9/20</a:t>
             </a:fld>
             <a:endParaRPr kumimoji="1" lang="ja-JP" altLang="en-US"/>
           </a:p>
@@ -1947,7 +1947,7 @@
           <a:p>
             <a:fld id="{2F8DFF1A-26F6-734D-81A6-596D27E77CDE}" type="datetime1">
               <a:rPr kumimoji="1" lang="ja-JP" altLang="en-US" smtClean="0"/>
-              <a:t>2018/6/13</a:t>
+              <a:t>2018/9/20</a:t>
             </a:fld>
             <a:endParaRPr kumimoji="1" lang="ja-JP" altLang="en-US"/>
           </a:p>
@@ -2373,7 +2373,7 @@
           <a:p>
             <a:fld id="{DA4D6ED2-2E77-3346-9932-196F8E0DDE9D}" type="datetime1">
               <a:rPr kumimoji="1" lang="ja-JP" altLang="en-US" smtClean="0"/>
-              <a:t>2018/6/13</a:t>
+              <a:t>2018/9/20</a:t>
             </a:fld>
             <a:endParaRPr kumimoji="1" lang="ja-JP" altLang="en-US"/>
           </a:p>
@@ -2486,7 +2486,7 @@
           <a:p>
             <a:fld id="{E0D62E53-0DE6-954C-A642-97CC889F03F2}" type="datetime1">
               <a:rPr kumimoji="1" lang="ja-JP" altLang="en-US" smtClean="0"/>
-              <a:t>2018/6/13</a:t>
+              <a:t>2018/9/20</a:t>
             </a:fld>
             <a:endParaRPr kumimoji="1" lang="ja-JP" altLang="en-US"/>
           </a:p>
@@ -2576,7 +2576,7 @@
           <a:p>
             <a:fld id="{4C76B436-8A19-1A40-8CF4-6DE75F461D19}" type="datetime1">
               <a:rPr kumimoji="1" lang="ja-JP" altLang="en-US" smtClean="0"/>
-              <a:t>2018/6/13</a:t>
+              <a:t>2018/9/20</a:t>
             </a:fld>
             <a:endParaRPr kumimoji="1" lang="ja-JP" altLang="en-US"/>
           </a:p>
@@ -2880,7 +2880,7 @@
           <a:p>
             <a:fld id="{50F977A8-A6EB-6544-A402-5123A38A5E0F}" type="datetime1">
               <a:rPr kumimoji="1" lang="ja-JP" altLang="en-US" smtClean="0"/>
-              <a:t>2018/6/13</a:t>
+              <a:t>2018/9/20</a:t>
             </a:fld>
             <a:endParaRPr kumimoji="1" lang="ja-JP" altLang="en-US"/>
           </a:p>
@@ -3132,7 +3132,7 @@
           <a:p>
             <a:fld id="{AC63A33F-D5AB-5D4B-9CED-7FFE32473911}" type="datetime1">
               <a:rPr kumimoji="1" lang="ja-JP" altLang="en-US" smtClean="0"/>
-              <a:t>2018/6/13</a:t>
+              <a:t>2018/9/20</a:t>
             </a:fld>
             <a:endParaRPr kumimoji="1" lang="ja-JP" altLang="en-US"/>
           </a:p>
@@ -3372,7 +3372,7 @@
           <a:p>
             <a:fld id="{533D1301-D078-CF4D-9B69-E985276E2D1F}" type="datetime1">
               <a:rPr kumimoji="1" lang="ja-JP" altLang="en-US" smtClean="0"/>
-              <a:t>2018/6/13</a:t>
+              <a:t>2018/9/20</a:t>
             </a:fld>
             <a:endParaRPr kumimoji="1" lang="ja-JP" altLang="en-US"/>
           </a:p>
@@ -3866,8 +3866,8 @@
           <a:p>
             <a:pPr algn="ctr"/>
             <a:r>
-              <a:rPr kumimoji="1" lang="en-US" altLang="ja-JP" dirty="0" smtClean="0"/>
-              <a:t>2018/06/04</a:t>
+              <a:rPr kumimoji="1" lang="en-US" altLang="ja-JP" smtClean="0"/>
+              <a:t>2018/09/20</a:t>
             </a:r>
             <a:endParaRPr kumimoji="1" lang="ja-JP" altLang="en-US" dirty="0"/>
           </a:p>
@@ -5819,293 +5819,16 @@
           <a:chExt cx="0" cy="0"/>
         </a:xfrm>
       </p:grpSpPr>
-      <p:sp>
-        <p:nvSpPr>
-          <p:cNvPr id="2" name="タイトル 1"/>
-          <p:cNvSpPr>
-            <a:spLocks noGrp="1"/>
-          </p:cNvSpPr>
-          <p:nvPr>
-            <p:ph type="title"/>
-          </p:nvPr>
-        </p:nvSpPr>
-        <p:spPr/>
-        <p:txBody>
-          <a:bodyPr/>
-          <a:lstStyle/>
-          <a:p>
-            <a:r>
-              <a:rPr lang="en-US" altLang="ja-JP" dirty="0"/>
-              <a:t>2. </a:t>
-            </a:r>
-            <a:r>
-              <a:rPr lang="en-US" altLang="ja-JP" dirty="0" smtClean="0"/>
-              <a:t>Download </a:t>
-            </a:r>
-            <a:r>
-              <a:rPr lang="en-US" altLang="ja-JP" dirty="0"/>
-              <a:t>Java3D</a:t>
-            </a:r>
-            <a:endParaRPr kumimoji="1" lang="ja-JP" altLang="en-US" dirty="0"/>
-          </a:p>
-        </p:txBody>
-      </p:sp>
-      <p:sp>
-        <p:nvSpPr>
-          <p:cNvPr id="3" name="スライド番号プレースホルダー 2"/>
-          <p:cNvSpPr>
-            <a:spLocks noGrp="1"/>
-          </p:cNvSpPr>
-          <p:nvPr>
-            <p:ph type="sldNum" sz="quarter" idx="12"/>
-          </p:nvPr>
-        </p:nvSpPr>
-        <p:spPr/>
-        <p:txBody>
-          <a:bodyPr/>
-          <a:lstStyle/>
-          <a:p>
-            <a:fld id="{7D34BB6B-1E1A-9541-9560-488905BF54FF}" type="slidenum">
-              <a:rPr kumimoji="1" lang="ja-JP" altLang="en-US" smtClean="0"/>
-              <a:t>3</a:t>
-            </a:fld>
-            <a:endParaRPr kumimoji="1" lang="ja-JP" altLang="en-US"/>
-          </a:p>
-        </p:txBody>
-      </p:sp>
-      <p:grpSp>
-        <p:nvGrpSpPr>
-          <p:cNvPr id="4" name="図形グループ 3"/>
-          <p:cNvGrpSpPr/>
-          <p:nvPr/>
-        </p:nvGrpSpPr>
-        <p:grpSpPr>
-          <a:xfrm>
-            <a:off x="4875448" y="1615108"/>
-            <a:ext cx="3365969" cy="5136979"/>
-            <a:chOff x="4395001" y="1295125"/>
-            <a:chExt cx="3521169" cy="5373838"/>
-          </a:xfrm>
-        </p:grpSpPr>
-        <p:pic>
-          <p:nvPicPr>
-            <p:cNvPr id="5" name="図 4"/>
-            <p:cNvPicPr>
-              <a:picLocks noChangeAspect="1"/>
-            </p:cNvPicPr>
-            <p:nvPr/>
-          </p:nvPicPr>
-          <p:blipFill>
-            <a:blip r:embed="rId2">
-              <a:extLst>
-                <a:ext uri="{28A0092B-C50C-407E-A947-70E740481C1C}">
-                  <a14:useLocalDpi xmlns:a14="http://schemas.microsoft.com/office/drawing/2010/main" val="0"/>
-                </a:ext>
-              </a:extLst>
-            </a:blip>
-            <a:stretch>
-              <a:fillRect/>
-            </a:stretch>
-          </p:blipFill>
-          <p:spPr>
-            <a:xfrm>
-              <a:off x="4395001" y="1295125"/>
-              <a:ext cx="3509493" cy="2104490"/>
-            </a:xfrm>
-            <a:prstGeom prst="rect">
-              <a:avLst/>
-            </a:prstGeom>
-          </p:spPr>
-        </p:pic>
-        <p:sp>
-          <p:nvSpPr>
-            <p:cNvPr id="6" name="正方形/長方形 5"/>
-            <p:cNvSpPr/>
-            <p:nvPr/>
-          </p:nvSpPr>
-          <p:spPr>
-            <a:xfrm>
-              <a:off x="4494758" y="2305053"/>
-              <a:ext cx="1251908" cy="194563"/>
-            </a:xfrm>
-            <a:prstGeom prst="rect">
-              <a:avLst/>
-            </a:prstGeom>
-            <a:noFill/>
-            <a:ln w="28575">
-              <a:solidFill>
-                <a:srgbClr val="00B050"/>
-              </a:solidFill>
-              <a:prstDash val="sysDash"/>
-            </a:ln>
-          </p:spPr>
-          <p:style>
-            <a:lnRef idx="2">
-              <a:schemeClr val="accent1">
-                <a:shade val="50000"/>
-              </a:schemeClr>
-            </a:lnRef>
-            <a:fillRef idx="1">
-              <a:schemeClr val="accent1"/>
-            </a:fillRef>
-            <a:effectRef idx="0">
-              <a:schemeClr val="accent1"/>
-            </a:effectRef>
-            <a:fontRef idx="minor">
-              <a:schemeClr val="lt1"/>
-            </a:fontRef>
-          </p:style>
-          <p:txBody>
-            <a:bodyPr rtlCol="0" anchor="ctr"/>
-            <a:lstStyle/>
-            <a:p>
-              <a:pPr algn="ctr"/>
-              <a:endParaRPr kumimoji="1" lang="ja-JP" altLang="en-US"/>
-            </a:p>
-          </p:txBody>
-        </p:sp>
-        <p:pic>
-          <p:nvPicPr>
-            <p:cNvPr id="7" name="図 6"/>
-            <p:cNvPicPr>
-              <a:picLocks noChangeAspect="1"/>
-            </p:cNvPicPr>
-            <p:nvPr/>
-          </p:nvPicPr>
-          <p:blipFill>
-            <a:blip r:embed="rId3">
-              <a:extLst>
-                <a:ext uri="{28A0092B-C50C-407E-A947-70E740481C1C}">
-                  <a14:useLocalDpi xmlns:a14="http://schemas.microsoft.com/office/drawing/2010/main" val="0"/>
-                </a:ext>
-              </a:extLst>
-            </a:blip>
-            <a:stretch>
-              <a:fillRect/>
-            </a:stretch>
-          </p:blipFill>
-          <p:spPr>
-            <a:xfrm>
-              <a:off x="4427860" y="3636955"/>
-              <a:ext cx="3488310" cy="3032008"/>
-            </a:xfrm>
-            <a:prstGeom prst="rect">
-              <a:avLst/>
-            </a:prstGeom>
-          </p:spPr>
-        </p:pic>
-        <p:sp>
-          <p:nvSpPr>
-            <p:cNvPr id="8" name="正方形/長方形 7"/>
-            <p:cNvSpPr/>
-            <p:nvPr/>
-          </p:nvSpPr>
-          <p:spPr>
-            <a:xfrm>
-              <a:off x="4477400" y="6437559"/>
-              <a:ext cx="1251908" cy="194563"/>
-            </a:xfrm>
-            <a:prstGeom prst="rect">
-              <a:avLst/>
-            </a:prstGeom>
-            <a:noFill/>
-            <a:ln w="28575">
-              <a:solidFill>
-                <a:srgbClr val="00B050"/>
-              </a:solidFill>
-              <a:prstDash val="sysDash"/>
-            </a:ln>
-          </p:spPr>
-          <p:style>
-            <a:lnRef idx="2">
-              <a:schemeClr val="accent1">
-                <a:shade val="50000"/>
-              </a:schemeClr>
-            </a:lnRef>
-            <a:fillRef idx="1">
-              <a:schemeClr val="accent1"/>
-            </a:fillRef>
-            <a:effectRef idx="0">
-              <a:schemeClr val="accent1"/>
-            </a:effectRef>
-            <a:fontRef idx="minor">
-              <a:schemeClr val="lt1"/>
-            </a:fontRef>
-          </p:style>
-          <p:txBody>
-            <a:bodyPr rtlCol="0" anchor="ctr"/>
-            <a:lstStyle/>
-            <a:p>
-              <a:pPr algn="ctr"/>
-              <a:endParaRPr kumimoji="1" lang="ja-JP" altLang="en-US"/>
-            </a:p>
-          </p:txBody>
-        </p:sp>
-      </p:grpSp>
-      <p:sp>
-        <p:nvSpPr>
-          <p:cNvPr id="9" name="テキスト ボックス 8"/>
-          <p:cNvSpPr txBox="1"/>
-          <p:nvPr/>
-        </p:nvSpPr>
-        <p:spPr>
-          <a:xfrm>
-            <a:off x="820948" y="836915"/>
-            <a:ext cx="7681784" cy="646331"/>
-          </a:xfrm>
-          <a:prstGeom prst="rect">
-            <a:avLst/>
-          </a:prstGeom>
-          <a:noFill/>
-        </p:spPr>
-        <p:txBody>
-          <a:bodyPr wrap="square" rtlCol="0">
-            <a:spAutoFit/>
-          </a:bodyPr>
-          <a:lstStyle/>
-          <a:p>
-            <a:r>
-              <a:rPr lang="en-US" altLang="ja-JP" dirty="0" err="1" smtClean="0"/>
-              <a:t>JSindo</a:t>
-            </a:r>
-            <a:r>
-              <a:rPr lang="en-US" altLang="ja-JP" dirty="0" smtClean="0"/>
-              <a:t> uses Java3D for visualization. A stable version, 1.6.0, is available from </a:t>
-            </a:r>
-            <a:r>
-              <a:rPr lang="en-US" altLang="ja-JP" dirty="0" err="1" smtClean="0"/>
-              <a:t>JogAmp</a:t>
-            </a:r>
-            <a:r>
-              <a:rPr lang="en-US" altLang="ja-JP" dirty="0" smtClean="0"/>
-              <a:t>. </a:t>
-            </a:r>
-            <a:r>
-              <a:rPr lang="en-US" altLang="ja-JP" dirty="0" err="1" smtClean="0"/>
-              <a:t>Goto</a:t>
-            </a:r>
-            <a:r>
-              <a:rPr lang="en-US" altLang="ja-JP" dirty="0" smtClean="0"/>
-              <a:t> http://</a:t>
-            </a:r>
-            <a:r>
-              <a:rPr lang="en-US" altLang="ja-JP" dirty="0" err="1" smtClean="0"/>
-              <a:t>jogamp.org</a:t>
-            </a:r>
-            <a:endParaRPr kumimoji="1" lang="ja-JP" altLang="en-US" dirty="0"/>
-          </a:p>
-        </p:txBody>
-      </p:sp>
       <p:pic>
         <p:nvPicPr>
-          <p:cNvPr id="10" name="図 9"/>
+          <p:cNvPr id="19" name="図 18"/>
           <p:cNvPicPr>
             <a:picLocks noChangeAspect="1"/>
           </p:cNvPicPr>
           <p:nvPr/>
         </p:nvPicPr>
         <p:blipFill>
-          <a:blip r:embed="rId4">
+          <a:blip r:embed="rId2">
             <a:extLst>
               <a:ext uri="{28A0092B-C50C-407E-A947-70E740481C1C}">
                 <a14:useLocalDpi xmlns:a14="http://schemas.microsoft.com/office/drawing/2010/main" val="0"/>
@@ -6118,62 +5841,78 @@
         </p:blipFill>
         <p:spPr>
           <a:xfrm>
-            <a:off x="925099" y="1566195"/>
-            <a:ext cx="3224666" cy="2796046"/>
+            <a:off x="4282021" y="1645002"/>
+            <a:ext cx="4608063" cy="3277093"/>
           </a:xfrm>
           <a:prstGeom prst="rect">
             <a:avLst/>
           </a:prstGeom>
         </p:spPr>
       </p:pic>
-      <p:cxnSp>
-        <p:nvCxnSpPr>
-          <p:cNvPr id="11" name="直線矢印コネクタ 10"/>
-          <p:cNvCxnSpPr>
-            <a:endCxn id="5" idx="1"/>
-          </p:cNvCxnSpPr>
-          <p:nvPr/>
-        </p:nvCxnSpPr>
-        <p:spPr>
-          <a:xfrm flipV="1">
-            <a:off x="1698171" y="2620974"/>
-            <a:ext cx="3177277" cy="395358"/>
-          </a:xfrm>
-          <a:prstGeom prst="straightConnector1">
-            <a:avLst/>
-          </a:prstGeom>
-          <a:ln w="28575">
-            <a:solidFill>
-              <a:srgbClr val="00B050"/>
-            </a:solidFill>
-            <a:tailEnd type="triangle"/>
-          </a:ln>
-        </p:spPr>
-        <p:style>
-          <a:lnRef idx="1">
-            <a:schemeClr val="accent1"/>
-          </a:lnRef>
-          <a:fillRef idx="0">
-            <a:schemeClr val="accent1"/>
-          </a:fillRef>
-          <a:effectRef idx="0">
-            <a:schemeClr val="accent1"/>
-          </a:effectRef>
-          <a:fontRef idx="minor">
-            <a:schemeClr val="tx1"/>
-          </a:fontRef>
-        </p:style>
-      </p:cxnSp>
-      <p:sp>
-        <p:nvSpPr>
-          <p:cNvPr id="12" name="正方形/長方形 11"/>
+      <p:sp>
+        <p:nvSpPr>
+          <p:cNvPr id="2" name="タイトル 1"/>
+          <p:cNvSpPr>
+            <a:spLocks noGrp="1"/>
+          </p:cNvSpPr>
+          <p:nvPr>
+            <p:ph type="title"/>
+          </p:nvPr>
+        </p:nvSpPr>
+        <p:spPr/>
+        <p:txBody>
+          <a:bodyPr/>
+          <a:lstStyle/>
+          <a:p>
+            <a:r>
+              <a:rPr lang="en-US" altLang="ja-JP" dirty="0"/>
+              <a:t>2. </a:t>
+            </a:r>
+            <a:r>
+              <a:rPr lang="en-US" altLang="ja-JP" dirty="0" smtClean="0"/>
+              <a:t>Download </a:t>
+            </a:r>
+            <a:r>
+              <a:rPr lang="en-US" altLang="ja-JP" dirty="0"/>
+              <a:t>Java3D</a:t>
+            </a:r>
+            <a:endParaRPr kumimoji="1" lang="ja-JP" altLang="en-US" dirty="0"/>
+          </a:p>
+        </p:txBody>
+      </p:sp>
+      <p:sp>
+        <p:nvSpPr>
+          <p:cNvPr id="3" name="スライド番号プレースホルダー 2"/>
+          <p:cNvSpPr>
+            <a:spLocks noGrp="1"/>
+          </p:cNvSpPr>
+          <p:nvPr>
+            <p:ph type="sldNum" sz="quarter" idx="12"/>
+          </p:nvPr>
+        </p:nvSpPr>
+        <p:spPr/>
+        <p:txBody>
+          <a:bodyPr/>
+          <a:lstStyle/>
+          <a:p>
+            <a:fld id="{7D34BB6B-1E1A-9541-9560-488905BF54FF}" type="slidenum">
+              <a:rPr kumimoji="1" lang="ja-JP" altLang="en-US" smtClean="0"/>
+              <a:t>3</a:t>
+            </a:fld>
+            <a:endParaRPr kumimoji="1" lang="ja-JP" altLang="en-US"/>
+          </a:p>
+        </p:txBody>
+      </p:sp>
+      <p:sp>
+        <p:nvSpPr>
+          <p:cNvPr id="6" name="正方形/長方形 5"/>
           <p:cNvSpPr/>
           <p:nvPr/>
         </p:nvSpPr>
         <p:spPr>
           <a:xfrm>
-            <a:off x="1138493" y="2962541"/>
-            <a:ext cx="546443" cy="142574"/>
+            <a:off x="4288973" y="3769553"/>
+            <a:ext cx="1268800" cy="198824"/>
           </a:xfrm>
           <a:prstGeom prst="rect">
             <a:avLst/>
@@ -6213,14 +5952,14 @@
       </p:sp>
       <p:sp>
         <p:nvSpPr>
-          <p:cNvPr id="13" name="テキスト ボックス 12"/>
+          <p:cNvPr id="9" name="テキスト ボックス 8"/>
           <p:cNvSpPr txBox="1"/>
           <p:nvPr/>
         </p:nvSpPr>
         <p:spPr>
           <a:xfrm>
-            <a:off x="1709906" y="2608219"/>
-            <a:ext cx="1072922" cy="369332"/>
+            <a:off x="820948" y="836915"/>
+            <a:ext cx="7681784" cy="646331"/>
           </a:xfrm>
           <a:prstGeom prst="rect">
             <a:avLst/>
@@ -6228,59 +5967,83 @@
           <a:noFill/>
         </p:spPr>
         <p:txBody>
-          <a:bodyPr wrap="none" rtlCol="0">
+          <a:bodyPr wrap="square" rtlCol="0">
             <a:spAutoFit/>
           </a:bodyPr>
           <a:lstStyle/>
           <a:p>
             <a:r>
-              <a:rPr kumimoji="1" lang="en-US" altLang="ja-JP" smtClean="0"/>
-              <a:t>click here</a:t>
+              <a:rPr lang="en-US" altLang="ja-JP" dirty="0" err="1" smtClean="0"/>
+              <a:t>JSindo</a:t>
+            </a:r>
+            <a:r>
+              <a:rPr lang="en-US" altLang="ja-JP" dirty="0" smtClean="0"/>
+              <a:t> uses Java3D for visualization. A stable version, 1.6.0, is available from </a:t>
+            </a:r>
+            <a:r>
+              <a:rPr lang="en-US" altLang="ja-JP" dirty="0" err="1" smtClean="0"/>
+              <a:t>JogAmp</a:t>
+            </a:r>
+            <a:r>
+              <a:rPr lang="en-US" altLang="ja-JP" dirty="0" smtClean="0"/>
+              <a:t>. </a:t>
+            </a:r>
+            <a:r>
+              <a:rPr lang="en-US" altLang="ja-JP" dirty="0" err="1" smtClean="0"/>
+              <a:t>Goto</a:t>
+            </a:r>
+            <a:r>
+              <a:rPr lang="en-US" altLang="ja-JP" dirty="0" smtClean="0"/>
+              <a:t> http://</a:t>
+            </a:r>
+            <a:r>
+              <a:rPr lang="en-US" altLang="ja-JP" dirty="0" err="1" smtClean="0"/>
+              <a:t>jogamp.org</a:t>
             </a:r>
             <a:endParaRPr kumimoji="1" lang="ja-JP" altLang="en-US" dirty="0"/>
           </a:p>
         </p:txBody>
       </p:sp>
-      <p:sp>
-        <p:nvSpPr>
-          <p:cNvPr id="14" name="テキスト ボックス 13"/>
-          <p:cNvSpPr txBox="1"/>
+      <p:pic>
+        <p:nvPicPr>
+          <p:cNvPr id="10" name="図 9"/>
+          <p:cNvPicPr>
+            <a:picLocks noChangeAspect="1"/>
+          </p:cNvPicPr>
           <p:nvPr/>
-        </p:nvSpPr>
+        </p:nvPicPr>
+        <p:blipFill>
+          <a:blip r:embed="rId3">
+            <a:extLst>
+              <a:ext uri="{28A0092B-C50C-407E-A947-70E740481C1C}">
+                <a14:useLocalDpi xmlns:a14="http://schemas.microsoft.com/office/drawing/2010/main" val="0"/>
+              </a:ext>
+            </a:extLst>
+          </a:blip>
+          <a:stretch>
+            <a:fillRect/>
+          </a:stretch>
+        </p:blipFill>
         <p:spPr>
           <a:xfrm>
-            <a:off x="5624144" y="2169935"/>
-            <a:ext cx="1072922" cy="369332"/>
+            <a:off x="712187" y="1673772"/>
+            <a:ext cx="3224666" cy="2796046"/>
           </a:xfrm>
           <a:prstGeom prst="rect">
             <a:avLst/>
           </a:prstGeom>
-          <a:noFill/>
-        </p:spPr>
-        <p:txBody>
-          <a:bodyPr wrap="none" rtlCol="0">
-            <a:spAutoFit/>
-          </a:bodyPr>
-          <a:lstStyle/>
-          <a:p>
-            <a:r>
-              <a:rPr kumimoji="1" lang="en-US" altLang="ja-JP" dirty="0" smtClean="0"/>
-              <a:t>click here</a:t>
-            </a:r>
-            <a:endParaRPr kumimoji="1" lang="ja-JP" altLang="en-US" dirty="0"/>
-          </a:p>
-        </p:txBody>
-      </p:sp>
+        </p:spPr>
+      </p:pic>
       <p:cxnSp>
         <p:nvCxnSpPr>
-          <p:cNvPr id="15" name="直線矢印コネクタ 14"/>
+          <p:cNvPr id="11" name="直線矢印コネクタ 10"/>
           <p:cNvCxnSpPr/>
           <p:nvPr/>
         </p:nvCxnSpPr>
         <p:spPr>
           <a:xfrm>
-            <a:off x="4261615" y="6319271"/>
-            <a:ext cx="580767" cy="291966"/>
+            <a:off x="2973525" y="3605319"/>
+            <a:ext cx="1192886" cy="0"/>
           </a:xfrm>
           <a:prstGeom prst="straightConnector1">
             <a:avLst/>
@@ -6309,19 +6072,66 @@
       </p:cxnSp>
       <p:sp>
         <p:nvSpPr>
-          <p:cNvPr id="16" name="テキスト ボックス 15"/>
-          <p:cNvSpPr txBox="1"/>
+          <p:cNvPr id="12" name="正方形/長方形 11"/>
+          <p:cNvSpPr/>
           <p:nvPr/>
         </p:nvSpPr>
         <p:spPr>
           <a:xfrm>
-            <a:off x="1906502" y="5735164"/>
-            <a:ext cx="2470035" cy="646331"/>
+            <a:off x="2810564" y="3536111"/>
+            <a:ext cx="157655" cy="142574"/>
           </a:xfrm>
           <a:prstGeom prst="rect">
             <a:avLst/>
           </a:prstGeom>
           <a:noFill/>
+          <a:ln w="28575">
+            <a:solidFill>
+              <a:srgbClr val="00B050"/>
+            </a:solidFill>
+            <a:prstDash val="sysDash"/>
+          </a:ln>
+        </p:spPr>
+        <p:style>
+          <a:lnRef idx="2">
+            <a:schemeClr val="accent1">
+              <a:shade val="50000"/>
+            </a:schemeClr>
+          </a:lnRef>
+          <a:fillRef idx="1">
+            <a:schemeClr val="accent1"/>
+          </a:fillRef>
+          <a:effectRef idx="0">
+            <a:schemeClr val="accent1"/>
+          </a:effectRef>
+          <a:fontRef idx="minor">
+            <a:schemeClr val="lt1"/>
+          </a:fontRef>
+        </p:style>
+        <p:txBody>
+          <a:bodyPr rtlCol="0" anchor="ctr"/>
+          <a:lstStyle/>
+          <a:p>
+            <a:pPr algn="ctr"/>
+            <a:endParaRPr kumimoji="1" lang="ja-JP" altLang="en-US"/>
+          </a:p>
+        </p:txBody>
+      </p:sp>
+      <p:sp>
+        <p:nvSpPr>
+          <p:cNvPr id="13" name="テキスト ボックス 12"/>
+          <p:cNvSpPr txBox="1"/>
+          <p:nvPr/>
+        </p:nvSpPr>
+        <p:spPr>
+          <a:xfrm>
+            <a:off x="3142914" y="3692457"/>
+            <a:ext cx="1072922" cy="369332"/>
+          </a:xfrm>
+          <a:prstGeom prst="rect">
+            <a:avLst/>
+          </a:prstGeom>
+          <a:noFill/>
         </p:spPr>
         <p:txBody>
           <a:bodyPr wrap="none" rtlCol="0">
@@ -6330,14 +6140,8 @@
           <a:lstStyle/>
           <a:p>
             <a:r>
-              <a:rPr kumimoji="1" lang="en-US" altLang="ja-JP" dirty="0" smtClean="0"/>
-              <a:t>click here and download</a:t>
-            </a:r>
-          </a:p>
-          <a:p>
-            <a:r>
-              <a:rPr lang="en-US" altLang="ja-JP" dirty="0" smtClean="0"/>
-              <a:t>jogamp-all-platforms.7z</a:t>
+              <a:rPr kumimoji="1" lang="en-US" altLang="ja-JP" smtClean="0"/>
+              <a:t>click here</a:t>
             </a:r>
             <a:endParaRPr kumimoji="1" lang="ja-JP" altLang="en-US" dirty="0"/>
           </a:p>
@@ -6345,14 +6149,14 @@
       </p:sp>
       <p:cxnSp>
         <p:nvCxnSpPr>
-          <p:cNvPr id="17" name="直線矢印コネクタ 16"/>
+          <p:cNvPr id="15" name="直線矢印コネクタ 14"/>
           <p:cNvCxnSpPr/>
           <p:nvPr/>
         </p:nvCxnSpPr>
         <p:spPr>
-          <a:xfrm flipH="1">
-            <a:off x="5521370" y="2699160"/>
-            <a:ext cx="509" cy="950418"/>
+          <a:xfrm flipV="1">
+            <a:off x="5351929" y="4042850"/>
+            <a:ext cx="1441" cy="946009"/>
           </a:xfrm>
           <a:prstGeom prst="straightConnector1">
             <a:avLst/>
@@ -6379,6 +6183,42 @@
           </a:fontRef>
         </p:style>
       </p:cxnSp>
+      <p:sp>
+        <p:nvSpPr>
+          <p:cNvPr id="16" name="テキスト ボックス 15"/>
+          <p:cNvSpPr txBox="1"/>
+          <p:nvPr/>
+        </p:nvSpPr>
+        <p:spPr>
+          <a:xfrm>
+            <a:off x="4811067" y="4968682"/>
+            <a:ext cx="2470035" cy="646331"/>
+          </a:xfrm>
+          <a:prstGeom prst="rect">
+            <a:avLst/>
+          </a:prstGeom>
+          <a:noFill/>
+        </p:spPr>
+        <p:txBody>
+          <a:bodyPr wrap="none" rtlCol="0">
+            <a:spAutoFit/>
+          </a:bodyPr>
+          <a:lstStyle/>
+          <a:p>
+            <a:r>
+              <a:rPr kumimoji="1" lang="en-US" altLang="ja-JP" dirty="0" smtClean="0"/>
+              <a:t>click here and download</a:t>
+            </a:r>
+          </a:p>
+          <a:p>
+            <a:r>
+              <a:rPr lang="en-US" altLang="ja-JP" dirty="0" smtClean="0"/>
+              <a:t>jogamp-all-platforms.7z</a:t>
+            </a:r>
+            <a:endParaRPr kumimoji="1" lang="ja-JP" altLang="en-US" dirty="0"/>
+          </a:p>
+        </p:txBody>
+      </p:sp>
     </p:spTree>
     <p:extLst>
       <p:ext uri="{BB962C8B-B14F-4D97-AF65-F5344CB8AC3E}">
@@ -7698,56 +7538,6 @@
       </p:sp>
       <p:sp>
         <p:nvSpPr>
-          <p:cNvPr id="18" name="テキスト ボックス 17"/>
-          <p:cNvSpPr txBox="1"/>
-          <p:nvPr/>
-        </p:nvSpPr>
-        <p:spPr>
-          <a:xfrm>
-            <a:off x="3760438" y="5777391"/>
-            <a:ext cx="4873706" cy="276999"/>
-          </a:xfrm>
-          <a:prstGeom prst="rect">
-            <a:avLst/>
-          </a:prstGeom>
-          <a:noFill/>
-        </p:spPr>
-        <p:txBody>
-          <a:bodyPr wrap="none" rtlCol="0">
-            <a:spAutoFit/>
-          </a:bodyPr>
-          <a:lstStyle/>
-          <a:p>
-            <a:r>
-              <a:rPr kumimoji="1" lang="en-US" altLang="ja-JP" sz="1200" dirty="0" smtClean="0"/>
-              <a:t>(* </a:t>
-            </a:r>
-            <a:r>
-              <a:rPr kumimoji="1" lang="en-US" altLang="ja-JP" sz="1200" dirty="0" smtClean="0">
-                <a:solidFill>
-                  <a:srgbClr val="FF0000"/>
-                </a:solidFill>
-              </a:rPr>
-              <a:t>XXX</a:t>
-            </a:r>
-            <a:r>
-              <a:rPr kumimoji="1" lang="en-US" altLang="ja-JP" sz="1200" dirty="0" smtClean="0"/>
-              <a:t> = armv6 and armv6hf are for ARM </a:t>
-            </a:r>
-            <a:r>
-              <a:rPr kumimoji="1" lang="en-US" altLang="ja-JP" sz="1200" dirty="0" err="1" smtClean="0"/>
-              <a:t>cpus</a:t>
-            </a:r>
-            <a:r>
-              <a:rPr kumimoji="1" lang="en-US" altLang="ja-JP" sz="1200" dirty="0" smtClean="0"/>
-              <a:t>, which are used for phones.) </a:t>
-            </a:r>
-            <a:endParaRPr kumimoji="1" lang="ja-JP" altLang="en-US" sz="1200" dirty="0"/>
-          </a:p>
-        </p:txBody>
-      </p:sp>
-      <p:sp>
-        <p:nvSpPr>
           <p:cNvPr id="8" name="テキスト ボックス 7"/>
           <p:cNvSpPr txBox="1"/>
           <p:nvPr/>
@@ -9627,7 +9417,7 @@
         <p:spPr>
           <a:xfrm>
             <a:off x="558343" y="1438664"/>
-            <a:ext cx="4567839" cy="5355312"/>
+            <a:ext cx="4567839" cy="5078313"/>
           </a:xfrm>
           <a:prstGeom prst="rect">
             <a:avLst/>
@@ -9660,10 +9450,7 @@
               <a:rPr lang="en-US" altLang="ja-JP" dirty="0"/>
               <a:t>Java. </a:t>
             </a:r>
-            <a:r>
-              <a:rPr lang="en-US" altLang="ja-JP" dirty="0" smtClean="0"/>
-              <a:t>See FAQ for some tips.</a:t>
-            </a:r>
+            <a:endParaRPr lang="en-US" altLang="ja-JP" dirty="0" smtClean="0"/>
           </a:p>
           <a:p>
             <a:endParaRPr lang="en-US" altLang="ja-JP" dirty="0" smtClean="0"/>
@@ -10231,7 +10018,7 @@
         </p:nvSpPr>
         <p:spPr>
           <a:xfrm>
-            <a:off x="1064479" y="3817216"/>
+            <a:off x="1064479" y="3534828"/>
             <a:ext cx="2416046" cy="276999"/>
           </a:xfrm>
           <a:prstGeom prst="rect">

</xml_diff>